<commit_message>
Deployed 1823c1c with MkDocs version: 1.4.2
</commit_message>
<xml_diff>
--- a/modulos/03-visao/slides-1.pptx
+++ b/modulos/03-visao/slides-1.pptx
@@ -19,6 +19,7 @@
     <p:sldId id="267" r:id="rId14"/>
     <p:sldId id="268" r:id="rId15"/>
     <p:sldId id="269" r:id="rId16"/>
+    <p:sldId id="270" r:id="rId17"/>
   </p:sldIdLst>
   <p:sldSz cx="9144000" cy="6858000" type="screen4x3"/>
   <p:notesSz cx="9144000" cy="6858000"/>
@@ -5579,6 +5580,270 @@
 </p:sld>
 </file>
 
+<file path=ppt/slides/slide15.xml><?xml version="1.0" encoding="utf-8"?>
+<p:sld xmlns:a="http://schemas.openxmlformats.org/drawingml/2006/main" xmlns:r="http://schemas.openxmlformats.org/officeDocument/2006/relationships" xmlns:p="http://schemas.openxmlformats.org/presentationml/2006/main" xmlns:m="http://schemas.openxmlformats.org/officeDocument/2006/math" xmlns:w="http://schemas.openxmlformats.org/wordprocessingml/2006/main" showMasterPhAnim="0" show="1">
+  <p:cSld name="">
+    <p:spTree>
+      <p:nvGrpSpPr>
+        <p:cNvPr id="1" name=""/>
+        <p:cNvGrpSpPr/>
+        <p:nvPr/>
+      </p:nvGrpSpPr>
+      <p:grpSpPr bwMode="auto">
+        <a:xfrm>
+          <a:off x="0" y="0"/>
+          <a:ext cx="0" cy="0"/>
+          <a:chOff x="0" y="0"/>
+          <a:chExt cx="0" cy="0"/>
+        </a:xfrm>
+      </p:grpSpPr>
+      <p:sp>
+        <p:nvSpPr>
+          <p:cNvPr id="1251313432" name="Título 1"/>
+          <p:cNvSpPr>
+            <a:spLocks noGrp="1"/>
+          </p:cNvSpPr>
+          <p:nvPr>
+            <p:ph type="title"/>
+          </p:nvPr>
+        </p:nvSpPr>
+        <p:spPr bwMode="auto"/>
+        <p:txBody>
+          <a:bodyPr/>
+          <a:lstStyle/>
+          <a:p>
+            <a:pPr>
+              <a:defRPr/>
+            </a:pPr>
+            <a:r>
+              <a:rPr lang="pt-BR"/>
+              <a:t>Regressão Linear</a:t>
+            </a:r>
+            <a:endParaRPr sz="1800"/>
+          </a:p>
+        </p:txBody>
+      </p:sp>
+      <p:sp>
+        <p:nvSpPr>
+          <p:cNvPr id="1694353913" name="Espaço Reservado para Texto 6"/>
+          <p:cNvSpPr>
+            <a:spLocks noGrp="1"/>
+          </p:cNvSpPr>
+          <p:nvPr>
+            <p:ph type="body" sz="quarter" idx="13"/>
+          </p:nvPr>
+        </p:nvSpPr>
+        <p:spPr bwMode="auto"/>
+        <p:txBody>
+          <a:bodyPr/>
+          <a:lstStyle/>
+          <a:p>
+            <a:pPr>
+              <a:defRPr/>
+            </a:pPr>
+            <a:endParaRPr lang="pt-BR"/>
+          </a:p>
+        </p:txBody>
+      </p:sp>
+      <p:sp>
+        <p:nvSpPr>
+          <p:cNvPr id="242420994" name=""/>
+          <p:cNvSpPr txBox="1"/>
+          <p:nvPr/>
+        </p:nvSpPr>
+        <p:spPr bwMode="auto">
+          <a:xfrm flipH="0" flipV="0">
+            <a:off x="472709" y="1575630"/>
+            <a:ext cx="8442994" cy="4480919"/>
+          </a:xfrm>
+          <a:prstGeom prst="rect">
+            <a:avLst/>
+          </a:prstGeom>
+          <a:noFill/>
+        </p:spPr>
+        <p:txBody>
+          <a:bodyPr vertOverflow="overflow" horzOverflow="overflow" vert="horz" wrap="square" lIns="91440" tIns="45720" rIns="91440" bIns="45720" numCol="1" spcCol="0" rtlCol="0" fromWordArt="0" anchor="t" anchorCtr="0" forceAA="0" upright="0" compatLnSpc="0">
+            <a:spAutoFit/>
+          </a:bodyPr>
+          <a:p>
+            <a:pPr marL="283878" indent="-283878">
+              <a:buAutoNum type="arabicPeriod"/>
+              <a:defRPr/>
+            </a:pPr>
+            <a:r>
+              <a:rPr/>
+              <a:t>Encontrar reta (ou qualquer outra função) que melhor “encaixa” em um conjunto de pontos</a:t>
+            </a:r>
+            <a:endParaRPr/>
+          </a:p>
+          <a:p>
+            <a:pPr marL="283878" indent="-283878">
+              <a:buAutoNum type="arabicPeriod"/>
+              <a:defRPr/>
+            </a:pPr>
+            <a:endParaRPr/>
+          </a:p>
+          <a:p>
+            <a:pPr marL="283878" indent="-283878">
+              <a:buAutoNum type="arabicPeriod"/>
+              <a:defRPr/>
+            </a:pPr>
+            <a:endParaRPr/>
+          </a:p>
+          <a:p>
+            <a:pPr marL="283878" indent="-283878">
+              <a:buAutoNum type="arabicPeriod"/>
+              <a:defRPr/>
+            </a:pPr>
+            <a:endParaRPr/>
+          </a:p>
+          <a:p>
+            <a:pPr marL="283878" indent="-283878">
+              <a:buAutoNum type="arabicPeriod"/>
+              <a:defRPr/>
+            </a:pPr>
+            <a:endParaRPr/>
+          </a:p>
+          <a:p>
+            <a:pPr marL="283878" indent="-283878">
+              <a:buAutoNum type="arabicPeriod"/>
+              <a:defRPr/>
+            </a:pPr>
+            <a:endParaRPr/>
+          </a:p>
+          <a:p>
+            <a:pPr marL="283878" indent="-283878">
+              <a:buAutoNum type="arabicPeriod"/>
+              <a:defRPr/>
+            </a:pPr>
+            <a:endParaRPr/>
+          </a:p>
+          <a:p>
+            <a:pPr marL="283878" indent="-283878">
+              <a:buAutoNum type="arabicPeriod"/>
+              <a:defRPr/>
+            </a:pPr>
+            <a:endParaRPr/>
+          </a:p>
+          <a:p>
+            <a:pPr marL="283878" indent="-283878">
+              <a:buAutoNum type="arabicPeriod"/>
+              <a:defRPr/>
+            </a:pPr>
+            <a:endParaRPr/>
+          </a:p>
+          <a:p>
+            <a:pPr marL="283878" indent="-283878">
+              <a:buAutoNum type="arabicPeriod"/>
+              <a:defRPr/>
+            </a:pPr>
+            <a:endParaRPr/>
+          </a:p>
+          <a:p>
+            <a:pPr marL="283878" indent="-283878">
+              <a:buAutoNum type="arabicPeriod"/>
+              <a:defRPr/>
+            </a:pPr>
+            <a:endParaRPr/>
+          </a:p>
+          <a:p>
+            <a:pPr marL="283878" indent="-283878">
+              <a:buAutoNum type="arabicPeriod"/>
+              <a:defRPr/>
+            </a:pPr>
+            <a:endParaRPr/>
+          </a:p>
+          <a:p>
+            <a:pPr marL="283878" indent="-283878">
+              <a:buAutoNum type="arabicPeriod"/>
+              <a:defRPr/>
+            </a:pPr>
+            <a:r>
+              <a:rPr/>
+              <a:t>Útil para encontrar “direção” em uma coleção de objetos</a:t>
+            </a:r>
+            <a:endParaRPr/>
+          </a:p>
+          <a:p>
+            <a:pPr marL="283878" indent="-283878">
+              <a:buAutoNum type="arabicPeriod"/>
+              <a:defRPr/>
+            </a:pPr>
+            <a:endParaRPr/>
+          </a:p>
+          <a:p>
+            <a:pPr marL="283878" indent="-283878">
+              <a:buAutoNum type="arabicPeriod"/>
+              <a:defRPr/>
+            </a:pPr>
+            <a:r>
+              <a:rPr/>
+              <a:t>“Resumindo” a posição de um conjunto de objetos em uma reta</a:t>
+            </a:r>
+            <a:endParaRPr/>
+          </a:p>
+        </p:txBody>
+      </p:sp>
+      <p:pic>
+        <p:nvPicPr>
+          <p:cNvPr id="1016929925" name=""/>
+          <p:cNvPicPr>
+            <a:picLocks noChangeAspect="1"/>
+          </p:cNvPicPr>
+          <p:nvPr/>
+        </p:nvPicPr>
+        <p:blipFill>
+          <a:blip r:embed="rId2"/>
+          <a:stretch/>
+        </p:blipFill>
+        <p:spPr bwMode="auto">
+          <a:xfrm>
+            <a:off x="893391" y="2465817"/>
+            <a:ext cx="3228975" cy="2400300"/>
+          </a:xfrm>
+          <a:prstGeom prst="rect">
+            <a:avLst/>
+          </a:prstGeom>
+        </p:spPr>
+      </p:pic>
+      <p:pic>
+        <p:nvPicPr>
+          <p:cNvPr id="1912982362" name=""/>
+          <p:cNvPicPr>
+            <a:picLocks noChangeAspect="1"/>
+          </p:cNvPicPr>
+          <p:nvPr/>
+        </p:nvPicPr>
+        <p:blipFill>
+          <a:blip r:embed="rId3"/>
+          <a:stretch/>
+        </p:blipFill>
+        <p:spPr bwMode="auto">
+          <a:xfrm>
+            <a:off x="5020653" y="2465817"/>
+            <a:ext cx="3228975" cy="2400300"/>
+          </a:xfrm>
+          <a:prstGeom prst="rect">
+            <a:avLst/>
+          </a:prstGeom>
+        </p:spPr>
+      </p:pic>
+    </p:spTree>
+  </p:cSld>
+  <p:clrMapOvr>
+    <a:masterClrMapping/>
+  </p:clrMapOvr>
+  <mc:AlternateContent xmlns:mc="http://schemas.openxmlformats.org/markup-compatibility/2006">
+    <mc:Choice xmlns:p14="http://schemas.microsoft.com/office/powerpoint/2010/main" Requires="p14">
+      <p:transition p14:dur="2000" advClick="1"/>
+    </mc:Choice>
+    <mc:Fallback>
+      <p:transition advClick="1"/>
+    </mc:Fallback>
+  </mc:AlternateContent>
+</p:sld>
+</file>
+
 <file path=ppt/slides/slide2.xml><?xml version="1.0" encoding="utf-8"?>
 <p:sld xmlns:a="http://schemas.openxmlformats.org/drawingml/2006/main" xmlns:r="http://schemas.openxmlformats.org/officeDocument/2006/relationships" xmlns:p="http://schemas.openxmlformats.org/presentationml/2006/main" xmlns:m="http://schemas.openxmlformats.org/officeDocument/2006/math" xmlns:w="http://schemas.openxmlformats.org/wordprocessingml/2006/main" showMasterPhAnim="0" show="1">
   <p:cSld name="">

</xml_diff>